<commit_message>
MacroUpdate Pendiente (Primera Parte)
</commit_message>
<xml_diff>
--- a/Informes_CCAA/PPT CCAA/Canarias.pptx
+++ b/Informes_CCAA/PPT CCAA/Canarias.pptx
@@ -3241,7 +3241,7 @@
       </p:sp>
       <p:pic>
         <p:nvPicPr>
-          <p:cNvPr descr="C:\Users\luis_\ONEDRI~1\INVEST~1\FIS_CV~1\R\CVD_IN~1\INFORM~1\PPTCCA~1\CANARI~1/figure-pptx/unnamed-chunk-7-1.svg" id="0" name="Picture 1"/>
+          <p:cNvPr descr="C:\Users\luis_\OneDrive%20-%20Universidad%20de%20Alcala\Investigacion\FIS_CVDinequities\R\cvd_inequities_spain\Informes_CCAA\PPT%20CCAA\Canarias_files/figure-pptx/unnamed-chunk-7-1.svg" id="0" name="Picture 1"/>
           <p:cNvPicPr>
             <a:picLocks noGrp="1" noChangeAspect="1"/>
           </p:cNvPicPr>
@@ -3318,7 +3318,7 @@
       </p:sp>
       <p:pic>
         <p:nvPicPr>
-          <p:cNvPr descr="C:\Users\luis_\ONEDRI~1\INVEST~1\FIS_CV~1\R\CVD_IN~1\INFORM~1\PPTCCA~1\CANARI~1/figure-pptx/unnamed-chunk-8-1.svg" id="0" name="Picture 1"/>
+          <p:cNvPr descr="C:\Users\luis_\OneDrive%20-%20Universidad%20de%20Alcala\Investigacion\FIS_CVDinequities\R\cvd_inequities_spain\Informes_CCAA\PPT%20CCAA\Canarias_files/figure-pptx/unnamed-chunk-8-1.svg" id="0" name="Picture 1"/>
           <p:cNvPicPr>
             <a:picLocks noGrp="1" noChangeAspect="1"/>
           </p:cNvPicPr>
@@ -3447,7 +3447,7 @@
       </p:sp>
       <p:pic>
         <p:nvPicPr>
-          <p:cNvPr descr="C:\Users\luis_\ONEDRI~1\INVEST~1\FIS_CV~1\R\CVD_IN~1\INFORM~1\PPTCCA~1\CANARI~1/figure-pptx/unnamed-chunk-9-1.svg" id="0" name="Picture 1"/>
+          <p:cNvPr descr="C:\Users\luis_\OneDrive%20-%20Universidad%20de%20Alcala\Investigacion\FIS_CVDinequities\R\cvd_inequities_spain\Informes_CCAA\PPT%20CCAA\Canarias_files/figure-pptx/unnamed-chunk-9-1.svg" id="0" name="Picture 1"/>
           <p:cNvPicPr>
             <a:picLocks noGrp="1" noChangeAspect="1"/>
           </p:cNvPicPr>
@@ -3524,7 +3524,7 @@
       </p:sp>
       <p:pic>
         <p:nvPicPr>
-          <p:cNvPr descr="C:\Users\luis_\ONEDRI~1\INVEST~1\FIS_CV~1\R\CVD_IN~1\INFORM~1\PPTCCA~1\CANARI~1/figure-pptx/unnamed-chunk-10-1.svg" id="0" name="Picture 1"/>
+          <p:cNvPr descr="C:\Users\luis_\OneDrive%20-%20Universidad%20de%20Alcala\Investigacion\FIS_CVDinequities\R\cvd_inequities_spain\Informes_CCAA\PPT%20CCAA\Canarias_files/figure-pptx/unnamed-chunk-10-1.svg" id="0" name="Picture 1"/>
           <p:cNvPicPr>
             <a:picLocks noGrp="1" noChangeAspect="1"/>
           </p:cNvPicPr>
@@ -3601,7 +3601,7 @@
       </p:sp>
       <p:pic>
         <p:nvPicPr>
-          <p:cNvPr descr="C:\Users\luis_\ONEDRI~1\INVEST~1\FIS_CV~1\R\CVD_IN~1\INFORM~1\PPTCCA~1\CANARI~1/figure-pptx/unnamed-chunk-11-1.svg" id="0" name="Picture 1"/>
+          <p:cNvPr descr="C:\Users\luis_\OneDrive%20-%20Universidad%20de%20Alcala\Investigacion\FIS_CVDinequities\R\cvd_inequities_spain\Informes_CCAA\PPT%20CCAA\Canarias_files/figure-pptx/unnamed-chunk-11-1.svg" id="0" name="Picture 1"/>
           <p:cNvPicPr>
             <a:picLocks noGrp="1" noChangeAspect="1"/>
           </p:cNvPicPr>
@@ -3678,7 +3678,7 @@
       </p:sp>
       <p:pic>
         <p:nvPicPr>
-          <p:cNvPr descr="C:\Users\luis_\ONEDRI~1\INVEST~1\FIS_CV~1\R\CVD_IN~1\INFORM~1\PPTCCA~1\CANARI~1/figure-pptx/unnamed-chunk-12-1.svg" id="0" name="Picture 1"/>
+          <p:cNvPr descr="C:\Users\luis_\OneDrive%20-%20Universidad%20de%20Alcala\Investigacion\FIS_CVDinequities\R\cvd_inequities_spain\Informes_CCAA\PPT%20CCAA\Canarias_files/figure-pptx/unnamed-chunk-12-1.svg" id="0" name="Picture 1"/>
           <p:cNvPicPr>
             <a:picLocks noGrp="1" noChangeAspect="1"/>
           </p:cNvPicPr>
@@ -3807,7 +3807,7 @@
       </p:sp>
       <p:pic>
         <p:nvPicPr>
-          <p:cNvPr descr="C:\Users\luis_\ONEDRI~1\INVEST~1\FIS_CV~1\R\CVD_IN~1\INFORM~1\PPTCCA~1\CANARI~1/figure-pptx/unnamed-chunk-13-1.svg" id="0" name="Picture 1"/>
+          <p:cNvPr descr="C:\Users\luis_\OneDrive%20-%20Universidad%20de%20Alcala\Investigacion\FIS_CVDinequities\R\cvd_inequities_spain\Informes_CCAA\PPT%20CCAA\Canarias_files/figure-pptx/unnamed-chunk-13-1.svg" id="0" name="Picture 1"/>
           <p:cNvPicPr>
             <a:picLocks noGrp="1" noChangeAspect="1"/>
           </p:cNvPicPr>
@@ -3884,7 +3884,7 @@
       </p:sp>
       <p:pic>
         <p:nvPicPr>
-          <p:cNvPr descr="C:\Users\luis_\ONEDRI~1\INVEST~1\FIS_CV~1\R\CVD_IN~1\INFORM~1\PPTCCA~1\CANARI~1/figure-pptx/unnamed-chunk-14-1.svg" id="0" name="Picture 1"/>
+          <p:cNvPr descr="C:\Users\luis_\OneDrive%20-%20Universidad%20de%20Alcala\Investigacion\FIS_CVDinequities\R\cvd_inequities_spain\Informes_CCAA\PPT%20CCAA\Canarias_files/figure-pptx/unnamed-chunk-14-1.svg" id="0" name="Picture 1"/>
           <p:cNvPicPr>
             <a:picLocks noGrp="1" noChangeAspect="1"/>
           </p:cNvPicPr>
@@ -4013,7 +4013,7 @@
       </p:sp>
       <p:pic>
         <p:nvPicPr>
-          <p:cNvPr descr="C:\Users\luis_\ONEDRI~1\INVEST~1\FIS_CV~1\R\CVD_IN~1\INFORM~1\PPTCCA~1\CANARI~1/figure-pptx/unnamed-chunk-15-1.svg" id="0" name="Picture 1"/>
+          <p:cNvPr descr="C:\Users\luis_\OneDrive%20-%20Universidad%20de%20Alcala\Investigacion\FIS_CVDinequities\R\cvd_inequities_spain\Informes_CCAA\PPT%20CCAA\Canarias_files/figure-pptx/unnamed-chunk-15-1.svg" id="0" name="Picture 1"/>
           <p:cNvPicPr>
             <a:picLocks noGrp="1" noChangeAspect="1"/>
           </p:cNvPicPr>
@@ -4090,7 +4090,7 @@
       </p:sp>
       <p:pic>
         <p:nvPicPr>
-          <p:cNvPr descr="C:\Users\luis_\ONEDRI~1\INVEST~1\FIS_CV~1\R\CVD_IN~1\INFORM~1\PPTCCA~1\CANARI~1/figure-pptx/unnamed-chunk-16-1.svg" id="0" name="Picture 1"/>
+          <p:cNvPr descr="C:\Users\luis_\OneDrive%20-%20Universidad%20de%20Alcala\Investigacion\FIS_CVDinequities\R\cvd_inequities_spain\Informes_CCAA\PPT%20CCAA\Canarias_files/figure-pptx/unnamed-chunk-16-1.svg" id="0" name="Picture 1"/>
           <p:cNvPicPr>
             <a:picLocks noGrp="1" noChangeAspect="1"/>
           </p:cNvPicPr>
@@ -4219,7 +4219,7 @@
       </p:sp>
       <p:pic>
         <p:nvPicPr>
-          <p:cNvPr descr="C:\Users\luis_\ONEDRI~1\INVEST~1\FIS_CV~1\R\CVD_IN~1\INFORM~1\PPTCCA~1\CANARI~1/figure-pptx/unnamed-chunk-17-1.svg" id="0" name="Picture 1"/>
+          <p:cNvPr descr="C:\Users\luis_\OneDrive%20-%20Universidad%20de%20Alcala\Investigacion\FIS_CVDinequities\R\cvd_inequities_spain\Informes_CCAA\PPT%20CCAA\Canarias_files/figure-pptx/unnamed-chunk-17-1.svg" id="0" name="Picture 1"/>
           <p:cNvPicPr>
             <a:picLocks noGrp="1" noChangeAspect="1"/>
           </p:cNvPicPr>
@@ -4296,7 +4296,7 @@
       </p:sp>
       <p:pic>
         <p:nvPicPr>
-          <p:cNvPr descr="C:\Users\luis_\ONEDRI~1\INVEST~1\FIS_CV~1\R\CVD_IN~1\INFORM~1\PPTCCA~1\CANARI~1/figure-pptx/unnamed-chunk-18-1.svg" id="0" name="Picture 1"/>
+          <p:cNvPr descr="C:\Users\luis_\OneDrive%20-%20Universidad%20de%20Alcala\Investigacion\FIS_CVDinequities\R\cvd_inequities_spain\Informes_CCAA\PPT%20CCAA\Canarias_files/figure-pptx/unnamed-chunk-18-1.svg" id="0" name="Picture 1"/>
           <p:cNvPicPr>
             <a:picLocks noGrp="1" noChangeAspect="1"/>
           </p:cNvPicPr>
@@ -4373,7 +4373,7 @@
       </p:sp>
       <p:pic>
         <p:nvPicPr>
-          <p:cNvPr descr="C:\Users\luis_\ONEDRI~1\INVEST~1\FIS_CV~1\R\CVD_IN~1\INFORM~1\PPTCCA~1\CANARI~1/figure-pptx/unnamed-chunk-19-1.svg" id="0" name="Picture 1"/>
+          <p:cNvPr descr="C:\Users\luis_\OneDrive%20-%20Universidad%20de%20Alcala\Investigacion\FIS_CVDinequities\R\cvd_inequities_spain\Informes_CCAA\PPT%20CCAA\Canarias_files/figure-pptx/unnamed-chunk-19-1.svg" id="0" name="Picture 1"/>
           <p:cNvPicPr>
             <a:picLocks noGrp="1" noChangeAspect="1"/>
           </p:cNvPicPr>
@@ -4450,7 +4450,7 @@
       </p:sp>
       <p:pic>
         <p:nvPicPr>
-          <p:cNvPr descr="C:\Users\luis_\ONEDRI~1\INVEST~1\FIS_CV~1\R\CVD_IN~1\INFORM~1\PPTCCA~1\CANARI~1/figure-pptx/unnamed-chunk-20-1.svg" id="0" name="Picture 1"/>
+          <p:cNvPr descr="C:\Users\luis_\OneDrive%20-%20Universidad%20de%20Alcala\Investigacion\FIS_CVDinequities\R\cvd_inequities_spain\Informes_CCAA\PPT%20CCAA\Canarias_files/figure-pptx/unnamed-chunk-20-1.svg" id="0" name="Picture 1"/>
           <p:cNvPicPr>
             <a:picLocks noGrp="1" noChangeAspect="1"/>
           </p:cNvPicPr>
@@ -4579,7 +4579,7 @@
       </p:sp>
       <p:pic>
         <p:nvPicPr>
-          <p:cNvPr descr="C:\Users\luis_\ONEDRI~1\INVEST~1\FIS_CV~1\R\CVD_IN~1\INFORM~1\PPTCCA~1\CANARI~1/figure-pptx/unnamed-chunk-21-1.svg" id="0" name="Picture 1"/>
+          <p:cNvPr descr="C:\Users\luis_\OneDrive%20-%20Universidad%20de%20Alcala\Investigacion\FIS_CVDinequities\R\cvd_inequities_spain\Informes_CCAA\PPT%20CCAA\Canarias_files/figure-pptx/unnamed-chunk-21-1.svg" id="0" name="Picture 1"/>
           <p:cNvPicPr>
             <a:picLocks noGrp="1" noChangeAspect="1"/>
           </p:cNvPicPr>
@@ -4656,7 +4656,7 @@
       </p:sp>
       <p:pic>
         <p:nvPicPr>
-          <p:cNvPr descr="C:\Users\luis_\ONEDRI~1\INVEST~1\FIS_CV~1\R\CVD_IN~1\INFORM~1\PPTCCA~1\CANARI~1/figure-pptx/unnamed-chunk-22-1.svg" id="0" name="Picture 1"/>
+          <p:cNvPr descr="C:\Users\luis_\OneDrive%20-%20Universidad%20de%20Alcala\Investigacion\FIS_CVDinequities\R\cvd_inequities_spain\Informes_CCAA\PPT%20CCAA\Canarias_files/figure-pptx/unnamed-chunk-22-1.svg" id="0" name="Picture 1"/>
           <p:cNvPicPr>
             <a:picLocks noGrp="1" noChangeAspect="1"/>
           </p:cNvPicPr>
@@ -4733,7 +4733,7 @@
       </p:sp>
       <p:pic>
         <p:nvPicPr>
-          <p:cNvPr descr="C:\Users\luis_\ONEDRI~1\INVEST~1\FIS_CV~1\R\CVD_IN~1\INFORM~1\PPTCCA~1\CANARI~1/figure-pptx/unnamed-chunk-1-1.svg" id="0" name="Picture 1"/>
+          <p:cNvPr descr="C:\Users\luis_\OneDrive%20-%20Universidad%20de%20Alcala\Investigacion\FIS_CVDinequities\R\cvd_inequities_spain\Informes_CCAA\PPT%20CCAA\Canarias_files/figure-pptx/unnamed-chunk-1-1.svg" id="0" name="Picture 1"/>
           <p:cNvPicPr>
             <a:picLocks noGrp="1" noChangeAspect="1"/>
           </p:cNvPicPr>
@@ -4810,7 +4810,7 @@
       </p:sp>
       <p:pic>
         <p:nvPicPr>
-          <p:cNvPr descr="C:\Users\luis_\ONEDRI~1\INVEST~1\FIS_CV~1\R\CVD_IN~1\INFORM~1\PPTCCA~1\CANARI~1/figure-pptx/unnamed-chunk-23-1.svg" id="0" name="Picture 1"/>
+          <p:cNvPr descr="C:\Users\luis_\OneDrive%20-%20Universidad%20de%20Alcala\Investigacion\FIS_CVDinequities\R\cvd_inequities_spain\Informes_CCAA\PPT%20CCAA\Canarias_files/figure-pptx/unnamed-chunk-23-1.svg" id="0" name="Picture 1"/>
           <p:cNvPicPr>
             <a:picLocks noGrp="1" noChangeAspect="1"/>
           </p:cNvPicPr>
@@ -4887,7 +4887,7 @@
       </p:sp>
       <p:pic>
         <p:nvPicPr>
-          <p:cNvPr descr="C:\Users\luis_\ONEDRI~1\INVEST~1\FIS_CV~1\R\CVD_IN~1\INFORM~1\PPTCCA~1\CANARI~1/figure-pptx/unnamed-chunk-24-1.svg" id="0" name="Picture 1"/>
+          <p:cNvPr descr="C:\Users\luis_\OneDrive%20-%20Universidad%20de%20Alcala\Investigacion\FIS_CVDinequities\R\cvd_inequities_spain\Informes_CCAA\PPT%20CCAA\Canarias_files/figure-pptx/unnamed-chunk-24-1.svg" id="0" name="Picture 1"/>
           <p:cNvPicPr>
             <a:picLocks noGrp="1" noChangeAspect="1"/>
           </p:cNvPicPr>
@@ -5016,7 +5016,7 @@
       </p:sp>
       <p:pic>
         <p:nvPicPr>
-          <p:cNvPr descr="C:\Users\luis_\ONEDRI~1\INVEST~1\FIS_CV~1\R\CVD_IN~1\INFORM~1\PPTCCA~1\CANARI~1/figure-pptx/unnamed-chunk-25-1.svg" id="0" name="Picture 1"/>
+          <p:cNvPr descr="C:\Users\luis_\OneDrive%20-%20Universidad%20de%20Alcala\Investigacion\FIS_CVDinequities\R\cvd_inequities_spain\Informes_CCAA\PPT%20CCAA\Canarias_files/figure-pptx/unnamed-chunk-25-1.svg" id="0" name="Picture 1"/>
           <p:cNvPicPr>
             <a:picLocks noGrp="1" noChangeAspect="1"/>
           </p:cNvPicPr>
@@ -5093,7 +5093,7 @@
       </p:sp>
       <p:pic>
         <p:nvPicPr>
-          <p:cNvPr descr="C:\Users\luis_\ONEDRI~1\INVEST~1\FIS_CV~1\R\CVD_IN~1\INFORM~1\PPTCCA~1\CANARI~1/figure-pptx/unnamed-chunk-26-1.svg" id="0" name="Picture 1"/>
+          <p:cNvPr descr="C:\Users\luis_\OneDrive%20-%20Universidad%20de%20Alcala\Investigacion\FIS_CVDinequities\R\cvd_inequities_spain\Informes_CCAA\PPT%20CCAA\Canarias_files/figure-pptx/unnamed-chunk-26-1.svg" id="0" name="Picture 1"/>
           <p:cNvPicPr>
             <a:picLocks noGrp="1" noChangeAspect="1"/>
           </p:cNvPicPr>
@@ -5170,7 +5170,7 @@
       </p:sp>
       <p:pic>
         <p:nvPicPr>
-          <p:cNvPr descr="C:\Users\luis_\ONEDRI~1\INVEST~1\FIS_CV~1\R\CVD_IN~1\INFORM~1\PPTCCA~1\CANARI~1/figure-pptx/unnamed-chunk-27-1.svg" id="0" name="Picture 1"/>
+          <p:cNvPr descr="C:\Users\luis_\OneDrive%20-%20Universidad%20de%20Alcala\Investigacion\FIS_CVDinequities\R\cvd_inequities_spain\Informes_CCAA\PPT%20CCAA\Canarias_files/figure-pptx/unnamed-chunk-27-1.svg" id="0" name="Picture 1"/>
           <p:cNvPicPr>
             <a:picLocks noGrp="1" noChangeAspect="1"/>
           </p:cNvPicPr>
@@ -5247,7 +5247,7 @@
       </p:sp>
       <p:pic>
         <p:nvPicPr>
-          <p:cNvPr descr="C:\Users\luis_\ONEDRI~1\INVEST~1\FIS_CV~1\R\CVD_IN~1\INFORM~1\PPTCCA~1\CANARI~1/figure-pptx/unnamed-chunk-28-1.svg" id="0" name="Picture 1"/>
+          <p:cNvPr descr="C:\Users\luis_\OneDrive%20-%20Universidad%20de%20Alcala\Investigacion\FIS_CVDinequities\R\cvd_inequities_spain\Informes_CCAA\PPT%20CCAA\Canarias_files/figure-pptx/unnamed-chunk-28-1.svg" id="0" name="Picture 1"/>
           <p:cNvPicPr>
             <a:picLocks noGrp="1" noChangeAspect="1"/>
           </p:cNvPicPr>
@@ -5376,7 +5376,7 @@
       </p:sp>
       <p:pic>
         <p:nvPicPr>
-          <p:cNvPr descr="C:\Users\luis_\ONEDRI~1\INVEST~1\FIS_CV~1\R\CVD_IN~1\INFORM~1\PPTCCA~1\CANARI~1/figure-pptx/unnamed-chunk-29-1.svg" id="0" name="Picture 1"/>
+          <p:cNvPr descr="C:\Users\luis_\OneDrive%20-%20Universidad%20de%20Alcala\Investigacion\FIS_CVDinequities\R\cvd_inequities_spain\Informes_CCAA\PPT%20CCAA\Canarias_files/figure-pptx/unnamed-chunk-29-1.svg" id="0" name="Picture 1"/>
           <p:cNvPicPr>
             <a:picLocks noGrp="1" noChangeAspect="1"/>
           </p:cNvPicPr>
@@ -5453,7 +5453,7 @@
       </p:sp>
       <p:pic>
         <p:nvPicPr>
-          <p:cNvPr descr="C:\Users\luis_\ONEDRI~1\INVEST~1\FIS_CV~1\R\CVD_IN~1\INFORM~1\PPTCCA~1\CANARI~1/figure-pptx/unnamed-chunk-30-1.svg" id="0" name="Picture 1"/>
+          <p:cNvPr descr="C:\Users\luis_\OneDrive%20-%20Universidad%20de%20Alcala\Investigacion\FIS_CVDinequities\R\cvd_inequities_spain\Informes_CCAA\PPT%20CCAA\Canarias_files/figure-pptx/unnamed-chunk-30-1.svg" id="0" name="Picture 1"/>
           <p:cNvPicPr>
             <a:picLocks noGrp="1" noChangeAspect="1"/>
           </p:cNvPicPr>
@@ -5530,7 +5530,7 @@
       </p:sp>
       <p:pic>
         <p:nvPicPr>
-          <p:cNvPr descr="C:\Users\luis_\ONEDRI~1\INVEST~1\FIS_CV~1\R\CVD_IN~1\INFORM~1\PPTCCA~1\CANARI~1/figure-pptx/unnamed-chunk-2-1.svg" id="0" name="Picture 1"/>
+          <p:cNvPr descr="C:\Users\luis_\OneDrive%20-%20Universidad%20de%20Alcala\Investigacion\FIS_CVDinequities\R\cvd_inequities_spain\Informes_CCAA\PPT%20CCAA\Canarias_files/figure-pptx/unnamed-chunk-2-1.svg" id="0" name="Picture 1"/>
           <p:cNvPicPr>
             <a:picLocks noGrp="1" noChangeAspect="1"/>
           </p:cNvPicPr>
@@ -5607,7 +5607,7 @@
       </p:sp>
       <p:pic>
         <p:nvPicPr>
-          <p:cNvPr descr="C:\Users\luis_\ONEDRI~1\INVEST~1\FIS_CV~1\R\CVD_IN~1\INFORM~1\PPTCCA~1\CANARI~1/figure-pptx/unnamed-chunk-31-1.svg" id="0" name="Picture 1"/>
+          <p:cNvPr descr="C:\Users\luis_\OneDrive%20-%20Universidad%20de%20Alcala\Investigacion\FIS_CVDinequities\R\cvd_inequities_spain\Informes_CCAA\PPT%20CCAA\Canarias_files/figure-pptx/unnamed-chunk-31-1.svg" id="0" name="Picture 1"/>
           <p:cNvPicPr>
             <a:picLocks noGrp="1" noChangeAspect="1"/>
           </p:cNvPicPr>
@@ -5684,7 +5684,7 @@
       </p:sp>
       <p:pic>
         <p:nvPicPr>
-          <p:cNvPr descr="C:\Users\luis_\ONEDRI~1\INVEST~1\FIS_CV~1\R\CVD_IN~1\INFORM~1\PPTCCA~1\CANARI~1/figure-pptx/unnamed-chunk-32-1.svg" id="0" name="Picture 1"/>
+          <p:cNvPr descr="C:\Users\luis_\OneDrive%20-%20Universidad%20de%20Alcala\Investigacion\FIS_CVDinequities\R\cvd_inequities_spain\Informes_CCAA\PPT%20CCAA\Canarias_files/figure-pptx/unnamed-chunk-32-1.svg" id="0" name="Picture 1"/>
           <p:cNvPicPr>
             <a:picLocks noGrp="1" noChangeAspect="1"/>
           </p:cNvPicPr>
@@ -5761,7 +5761,7 @@
       </p:sp>
       <p:pic>
         <p:nvPicPr>
-          <p:cNvPr descr="C:\Users\luis_\ONEDRI~1\INVEST~1\FIS_CV~1\R\CVD_IN~1\INFORM~1\PPTCCA~1\CANARI~1/figure-pptx/unnamed-chunk-3-1.svg" id="0" name="Picture 1"/>
+          <p:cNvPr descr="C:\Users\luis_\OneDrive%20-%20Universidad%20de%20Alcala\Investigacion\FIS_CVDinequities\R\cvd_inequities_spain\Informes_CCAA\PPT%20CCAA\Canarias_files/figure-pptx/unnamed-chunk-3-1.svg" id="0" name="Picture 1"/>
           <p:cNvPicPr>
             <a:picLocks noGrp="1" noChangeAspect="1"/>
           </p:cNvPicPr>
@@ -5838,7 +5838,7 @@
       </p:sp>
       <p:pic>
         <p:nvPicPr>
-          <p:cNvPr descr="C:\Users\luis_\ONEDRI~1\INVEST~1\FIS_CV~1\R\CVD_IN~1\INFORM~1\PPTCCA~1\CANARI~1/figure-pptx/unnamed-chunk-4-1.svg" id="0" name="Picture 1"/>
+          <p:cNvPr descr="C:\Users\luis_\OneDrive%20-%20Universidad%20de%20Alcala\Investigacion\FIS_CVDinequities\R\cvd_inequities_spain\Informes_CCAA\PPT%20CCAA\Canarias_files/figure-pptx/unnamed-chunk-4-1.svg" id="0" name="Picture 1"/>
           <p:cNvPicPr>
             <a:picLocks noGrp="1" noChangeAspect="1"/>
           </p:cNvPicPr>
@@ -5967,7 +5967,7 @@
       </p:sp>
       <p:pic>
         <p:nvPicPr>
-          <p:cNvPr descr="C:\Users\luis_\ONEDRI~1\INVEST~1\FIS_CV~1\R\CVD_IN~1\INFORM~1\PPTCCA~1\CANARI~1/figure-pptx/unnamed-chunk-5-1.svg" id="0" name="Picture 1"/>
+          <p:cNvPr descr="C:\Users\luis_\OneDrive%20-%20Universidad%20de%20Alcala\Investigacion\FIS_CVDinequities\R\cvd_inequities_spain\Informes_CCAA\PPT%20CCAA\Canarias_files/figure-pptx/unnamed-chunk-5-1.svg" id="0" name="Picture 1"/>
           <p:cNvPicPr>
             <a:picLocks noGrp="1" noChangeAspect="1"/>
           </p:cNvPicPr>
@@ -6044,7 +6044,7 @@
       </p:sp>
       <p:pic>
         <p:nvPicPr>
-          <p:cNvPr descr="C:\Users\luis_\ONEDRI~1\INVEST~1\FIS_CV~1\R\CVD_IN~1\INFORM~1\PPTCCA~1\CANARI~1/figure-pptx/unnamed-chunk-6-1.svg" id="0" name="Picture 1"/>
+          <p:cNvPr descr="C:\Users\luis_\OneDrive%20-%20Universidad%20de%20Alcala\Investigacion\FIS_CVDinequities\R\cvd_inequities_spain\Informes_CCAA\PPT%20CCAA\Canarias_files/figure-pptx/unnamed-chunk-6-1.svg" id="0" name="Picture 1"/>
           <p:cNvPicPr>
             <a:picLocks noGrp="1" noChangeAspect="1"/>
           </p:cNvPicPr>

</xml_diff>